<commit_message>
Modified input document and code snippet.
</commit_message>
<xml_diff>
--- a/Slides/Iterate-slide-elements/.NET/Iterate-slide-elements/Data/Template.pptx
+++ b/Slides/Iterate-slide-elements/.NET/Iterate-slide-elements/Data/Template.pptx
@@ -10,6 +10,7 @@
     <p:sldId id="261" r:id="rId4"/>
     <p:sldId id="258" r:id="rId5"/>
     <p:sldId id="263" r:id="rId6"/>
+    <p:sldId id="264" r:id="rId7"/>
   </p:sldIdLst>
   <p:sldSz cx="12192000" cy="6858000"/>
   <p:notesSz cx="6858000" cy="9144000"/>
@@ -8085,6 +8086,115 @@
 </p:sld>
 </file>
 
+<file path=ppt/slides/slide6.xml><?xml version="1.0" encoding="utf-8"?>
+<p:sld xmlns:a="http://schemas.openxmlformats.org/drawingml/2006/main" xmlns:r="http://schemas.openxmlformats.org/officeDocument/2006/relationships" xmlns:p="http://schemas.openxmlformats.org/presentationml/2006/main">
+  <p:cSld>
+    <p:spTree>
+      <p:nvGrpSpPr>
+        <p:cNvPr id="1" name=""/>
+        <p:cNvGrpSpPr/>
+        <p:nvPr/>
+      </p:nvGrpSpPr>
+      <p:grpSpPr>
+        <a:xfrm>
+          <a:off x="0" y="0"/>
+          <a:ext cx="0" cy="0"/>
+          <a:chOff x="0" y="0"/>
+          <a:chExt cx="0" cy="0"/>
+        </a:xfrm>
+      </p:grpSpPr>
+      <p:sp>
+        <p:nvSpPr>
+          <p:cNvPr id="2" name="Rectangle2"/>
+          <p:cNvSpPr>
+            <a:spLocks/>
+          </p:cNvSpPr>
+          <p:nvPr/>
+        </p:nvSpPr>
+        <p:spPr>
+          <a:xfrm>
+            <a:off x="5334000" y="3175000"/>
+            <a:ext cx="1270000" cy="1270000"/>
+          </a:xfrm>
+          <a:prstGeom prst="rect">
+            <a:avLst/>
+          </a:prstGeom>
+          <a:ln>
+            <a:headEnd type="none"/>
+            <a:tailEnd type="none"/>
+          </a:ln>
+        </p:spPr>
+        <p:style>
+          <a:lnRef idx="2">
+            <a:schemeClr val="accent1">
+              <a:shade val="50000"/>
+            </a:schemeClr>
+          </a:lnRef>
+          <a:fillRef idx="1">
+            <a:schemeClr val="accent1"/>
+          </a:fillRef>
+          <a:effectRef idx="0">
+            <a:schemeClr val="accent1"/>
+          </a:effectRef>
+          <a:fontRef idx="minor">
+            <a:schemeClr val="tx1"/>
+          </a:fontRef>
+        </p:style>
+        <p:txBody>
+          <a:bodyPr wrap="square"/>
+          <a:lstStyle/>
+          <a:p>
+            <a:endParaRPr/>
+          </a:p>
+        </p:txBody>
+      </p:sp>
+      <p:cxnSp>
+        <p:nvCxnSpPr>
+          <p:cNvPr id="3" name="Straight3"/>
+          <p:cNvCxnSpPr>
+            <a:stCxn id="2" idx="0"/>
+          </p:cNvCxnSpPr>
+          <p:nvPr/>
+        </p:nvCxnSpPr>
+        <p:spPr>
+          <a:xfrm flipV="1">
+            <a:off x="5969000" y="1905000"/>
+            <a:ext cx="0" cy="1270000"/>
+          </a:xfrm>
+          <a:prstGeom prst="straightConnector1">
+            <a:avLst/>
+          </a:prstGeom>
+          <a:ln>
+            <a:solidFill>
+              <a:srgbClr val="000000"/>
+            </a:solidFill>
+            <a:headEnd type="triangle"/>
+            <a:tailEnd type="none"/>
+          </a:ln>
+        </p:spPr>
+        <p:style>
+          <a:lnRef idx="2">
+            <a:schemeClr val="accent1"/>
+          </a:lnRef>
+          <a:fillRef idx="1">
+            <a:schemeClr val="accent1"/>
+          </a:fillRef>
+          <a:effectRef idx="0">
+            <a:schemeClr val="accent1"/>
+          </a:effectRef>
+          <a:fontRef idx="minor">
+            <a:schemeClr val="tx1"/>
+          </a:fontRef>
+        </p:style>
+      </p:cxnSp>
+    </p:spTree>
+  </p:cSld>
+  <p:clrMapOvr>
+    <a:masterClrMapping/>
+  </p:clrMapOvr>
+</p:sld>
+</file>
+
 <file path=ppt/theme/theme1.xml><?xml version="1.0" encoding="utf-8"?>
 <a:theme xmlns:a="http://schemas.openxmlformats.org/drawingml/2006/main" name="Office Theme">
   <a:themeElements>

</xml_diff>